<commit_message>
Update R and Exp 1 CSV and project report
</commit_message>
<xml_diff>
--- a/Project Proposal for Analytical Workflow, Fall 2022.pptx
+++ b/Project Proposal for Analytical Workflow, Fall 2022.pptx
@@ -5,7 +5,7 @@
     <p:sldMasterId id="2147483659" r:id="rId1"/>
   </p:sldMasterIdLst>
   <p:notesMasterIdLst>
-    <p:notesMasterId r:id="rId11"/>
+    <p:notesMasterId r:id="rId14"/>
   </p:notesMasterIdLst>
   <p:sldIdLst>
     <p:sldId id="256" r:id="rId2"/>
@@ -15,8 +15,11 @@
     <p:sldId id="260" r:id="rId6"/>
     <p:sldId id="261" r:id="rId7"/>
     <p:sldId id="262" r:id="rId8"/>
-    <p:sldId id="263" r:id="rId9"/>
-    <p:sldId id="264" r:id="rId10"/>
+    <p:sldId id="264" r:id="rId9"/>
+    <p:sldId id="263" r:id="rId10"/>
+    <p:sldId id="266" r:id="rId11"/>
+    <p:sldId id="267" r:id="rId12"/>
+    <p:sldId id="268" r:id="rId13"/>
   </p:sldIdLst>
   <p:sldSz cx="9144000" cy="5143500" type="screen16x9"/>
   <p:notesSz cx="6858000" cy="9144000"/>
@@ -842,7 +845,7 @@
         </p:nvSpPr>
         <p:spPr>
           <a:xfrm>
-            <a:off x="381300" y="685800"/>
+            <a:off x="381000" y="685800"/>
             <a:ext cx="6096000" cy="3429000"/>
           </a:xfrm>
           <a:custGeom>
@@ -1154,7 +1157,7 @@
         </p:nvSpPr>
         <p:spPr>
           <a:xfrm>
-            <a:off x="381300" y="685800"/>
+            <a:off x="381000" y="685800"/>
             <a:ext cx="6096000" cy="3429000"/>
           </a:xfrm>
           <a:custGeom>
@@ -1362,7 +1365,7 @@
         </p:nvSpPr>
         <p:spPr>
           <a:xfrm>
-            <a:off x="381300" y="685800"/>
+            <a:off x="381000" y="685800"/>
             <a:ext cx="6096000" cy="3429000"/>
           </a:xfrm>
           <a:custGeom>
@@ -1466,7 +1469,7 @@
         </p:nvSpPr>
         <p:spPr>
           <a:xfrm>
-            <a:off x="381300" y="685800"/>
+            <a:off x="381000" y="685800"/>
             <a:ext cx="6096000" cy="3429000"/>
           </a:xfrm>
           <a:custGeom>
@@ -6473,6 +6476,291 @@
 </p:sld>
 </file>
 
+<file path=ppt/slides/slide10.xml><?xml version="1.0" encoding="utf-8"?>
+<p:sld xmlns:a="http://schemas.openxmlformats.org/drawingml/2006/main" xmlns:r="http://schemas.openxmlformats.org/officeDocument/2006/relationships" xmlns:p="http://schemas.openxmlformats.org/presentationml/2006/main">
+  <p:cSld>
+    <p:spTree>
+      <p:nvGrpSpPr>
+        <p:cNvPr id="1" name=""/>
+        <p:cNvGrpSpPr/>
+        <p:nvPr/>
+      </p:nvGrpSpPr>
+      <p:grpSpPr>
+        <a:xfrm>
+          <a:off x="0" y="0"/>
+          <a:ext cx="0" cy="0"/>
+          <a:chOff x="0" y="0"/>
+          <a:chExt cx="0" cy="0"/>
+        </a:xfrm>
+      </p:grpSpPr>
+      <p:sp>
+        <p:nvSpPr>
+          <p:cNvPr id="2" name="Title 1">
+            <a:extLst>
+              <a:ext uri="{FF2B5EF4-FFF2-40B4-BE49-F238E27FC236}">
+                <a16:creationId xmlns:a16="http://schemas.microsoft.com/office/drawing/2014/main" id="{EFEDD688-27DF-D692-0E0D-AED3E5476ADB}"/>
+              </a:ext>
+            </a:extLst>
+          </p:cNvPr>
+          <p:cNvSpPr>
+            <a:spLocks noGrp="1"/>
+          </p:cNvSpPr>
+          <p:nvPr>
+            <p:ph type="title"/>
+          </p:nvPr>
+        </p:nvSpPr>
+        <p:spPr/>
+        <p:txBody>
+          <a:bodyPr>
+            <a:normAutofit fontScale="90000"/>
+          </a:bodyPr>
+          <a:lstStyle/>
+          <a:p>
+            <a:r>
+              <a:rPr lang="en-US" dirty="0"/>
+              <a:t>Success this quarter</a:t>
+            </a:r>
+          </a:p>
+        </p:txBody>
+      </p:sp>
+      <p:sp>
+        <p:nvSpPr>
+          <p:cNvPr id="3" name="Text Placeholder 2">
+            <a:extLst>
+              <a:ext uri="{FF2B5EF4-FFF2-40B4-BE49-F238E27FC236}">
+                <a16:creationId xmlns:a16="http://schemas.microsoft.com/office/drawing/2014/main" id="{203FD2DD-C994-602C-2DE5-A867307220FB}"/>
+              </a:ext>
+            </a:extLst>
+          </p:cNvPr>
+          <p:cNvSpPr>
+            <a:spLocks noGrp="1"/>
+          </p:cNvSpPr>
+          <p:nvPr>
+            <p:ph type="body" idx="1"/>
+          </p:nvPr>
+        </p:nvSpPr>
+        <p:spPr/>
+        <p:txBody>
+          <a:bodyPr/>
+          <a:lstStyle/>
+          <a:p>
+            <a:r>
+              <a:rPr lang="en-US" dirty="0"/>
+              <a:t>Recreate results and graphical outputs </a:t>
+            </a:r>
+          </a:p>
+          <a:p>
+            <a:r>
+              <a:rPr lang="en-US" dirty="0"/>
+              <a:t>Improve file organization</a:t>
+            </a:r>
+          </a:p>
+          <a:p>
+            <a:r>
+              <a:rPr lang="en-US" dirty="0"/>
+              <a:t>Streamlining data analysis</a:t>
+            </a:r>
+          </a:p>
+          <a:p>
+            <a:r>
+              <a:rPr lang="en-US" dirty="0"/>
+              <a:t>Creating reproducibility </a:t>
+            </a:r>
+          </a:p>
+          <a:p>
+            <a:r>
+              <a:rPr lang="en-US" dirty="0"/>
+              <a:t>Streamlining this process and make it reproducible</a:t>
+            </a:r>
+          </a:p>
+          <a:p>
+            <a:endParaRPr lang="en-US" dirty="0"/>
+          </a:p>
+        </p:txBody>
+      </p:sp>
+    </p:spTree>
+    <p:extLst>
+      <p:ext uri="{BB962C8B-B14F-4D97-AF65-F5344CB8AC3E}">
+        <p14:creationId xmlns:p14="http://schemas.microsoft.com/office/powerpoint/2010/main" val="3121009972"/>
+      </p:ext>
+    </p:extLst>
+  </p:cSld>
+  <p:clrMapOvr>
+    <a:masterClrMapping/>
+  </p:clrMapOvr>
+</p:sld>
+</file>
+
+<file path=ppt/slides/slide11.xml><?xml version="1.0" encoding="utf-8"?>
+<p:sld xmlns:a="http://schemas.openxmlformats.org/drawingml/2006/main" xmlns:r="http://schemas.openxmlformats.org/officeDocument/2006/relationships" xmlns:p="http://schemas.openxmlformats.org/presentationml/2006/main">
+  <p:cSld>
+    <p:spTree>
+      <p:nvGrpSpPr>
+        <p:cNvPr id="1" name=""/>
+        <p:cNvGrpSpPr/>
+        <p:nvPr/>
+      </p:nvGrpSpPr>
+      <p:grpSpPr>
+        <a:xfrm>
+          <a:off x="0" y="0"/>
+          <a:ext cx="0" cy="0"/>
+          <a:chOff x="0" y="0"/>
+          <a:chExt cx="0" cy="0"/>
+        </a:xfrm>
+      </p:grpSpPr>
+      <p:sp>
+        <p:nvSpPr>
+          <p:cNvPr id="2" name="Title 1">
+            <a:extLst>
+              <a:ext uri="{FF2B5EF4-FFF2-40B4-BE49-F238E27FC236}">
+                <a16:creationId xmlns:a16="http://schemas.microsoft.com/office/drawing/2014/main" id="{EFEDD688-27DF-D692-0E0D-AED3E5476ADB}"/>
+              </a:ext>
+            </a:extLst>
+          </p:cNvPr>
+          <p:cNvSpPr>
+            <a:spLocks noGrp="1"/>
+          </p:cNvSpPr>
+          <p:nvPr>
+            <p:ph type="title"/>
+          </p:nvPr>
+        </p:nvSpPr>
+        <p:spPr/>
+        <p:txBody>
+          <a:bodyPr>
+            <a:normAutofit fontScale="90000"/>
+          </a:bodyPr>
+          <a:lstStyle/>
+          <a:p>
+            <a:r>
+              <a:rPr lang="en-US" dirty="0"/>
+              <a:t>Scientific insights achieved</a:t>
+            </a:r>
+          </a:p>
+        </p:txBody>
+      </p:sp>
+      <p:sp>
+        <p:nvSpPr>
+          <p:cNvPr id="3" name="Text Placeholder 2">
+            <a:extLst>
+              <a:ext uri="{FF2B5EF4-FFF2-40B4-BE49-F238E27FC236}">
+                <a16:creationId xmlns:a16="http://schemas.microsoft.com/office/drawing/2014/main" id="{203FD2DD-C994-602C-2DE5-A867307220FB}"/>
+              </a:ext>
+            </a:extLst>
+          </p:cNvPr>
+          <p:cNvSpPr>
+            <a:spLocks noGrp="1"/>
+          </p:cNvSpPr>
+          <p:nvPr>
+            <p:ph type="body" idx="1"/>
+          </p:nvPr>
+        </p:nvSpPr>
+        <p:spPr/>
+        <p:txBody>
+          <a:bodyPr/>
+          <a:lstStyle/>
+          <a:p>
+            <a:endParaRPr lang="en-US"/>
+          </a:p>
+        </p:txBody>
+      </p:sp>
+    </p:spTree>
+    <p:extLst>
+      <p:ext uri="{BB962C8B-B14F-4D97-AF65-F5344CB8AC3E}">
+        <p14:creationId xmlns:p14="http://schemas.microsoft.com/office/powerpoint/2010/main" val="4052157631"/>
+      </p:ext>
+    </p:extLst>
+  </p:cSld>
+  <p:clrMapOvr>
+    <a:masterClrMapping/>
+  </p:clrMapOvr>
+</p:sld>
+</file>
+
+<file path=ppt/slides/slide12.xml><?xml version="1.0" encoding="utf-8"?>
+<p:sld xmlns:a="http://schemas.openxmlformats.org/drawingml/2006/main" xmlns:r="http://schemas.openxmlformats.org/officeDocument/2006/relationships" xmlns:p="http://schemas.openxmlformats.org/presentationml/2006/main">
+  <p:cSld>
+    <p:spTree>
+      <p:nvGrpSpPr>
+        <p:cNvPr id="1" name=""/>
+        <p:cNvGrpSpPr/>
+        <p:nvPr/>
+      </p:nvGrpSpPr>
+      <p:grpSpPr>
+        <a:xfrm>
+          <a:off x="0" y="0"/>
+          <a:ext cx="0" cy="0"/>
+          <a:chOff x="0" y="0"/>
+          <a:chExt cx="0" cy="0"/>
+        </a:xfrm>
+      </p:grpSpPr>
+      <p:sp>
+        <p:nvSpPr>
+          <p:cNvPr id="2" name="Title 1">
+            <a:extLst>
+              <a:ext uri="{FF2B5EF4-FFF2-40B4-BE49-F238E27FC236}">
+                <a16:creationId xmlns:a16="http://schemas.microsoft.com/office/drawing/2014/main" id="{EFEDD688-27DF-D692-0E0D-AED3E5476ADB}"/>
+              </a:ext>
+            </a:extLst>
+          </p:cNvPr>
+          <p:cNvSpPr>
+            <a:spLocks noGrp="1"/>
+          </p:cNvSpPr>
+          <p:nvPr>
+            <p:ph type="title"/>
+          </p:nvPr>
+        </p:nvSpPr>
+        <p:spPr/>
+        <p:txBody>
+          <a:bodyPr>
+            <a:normAutofit fontScale="90000"/>
+          </a:bodyPr>
+          <a:lstStyle/>
+          <a:p>
+            <a:r>
+              <a:rPr lang="en-US" dirty="0"/>
+              <a:t>Main sticking points and future plans</a:t>
+            </a:r>
+          </a:p>
+        </p:txBody>
+      </p:sp>
+      <p:sp>
+        <p:nvSpPr>
+          <p:cNvPr id="3" name="Text Placeholder 2">
+            <a:extLst>
+              <a:ext uri="{FF2B5EF4-FFF2-40B4-BE49-F238E27FC236}">
+                <a16:creationId xmlns:a16="http://schemas.microsoft.com/office/drawing/2014/main" id="{203FD2DD-C994-602C-2DE5-A867307220FB}"/>
+              </a:ext>
+            </a:extLst>
+          </p:cNvPr>
+          <p:cNvSpPr>
+            <a:spLocks noGrp="1"/>
+          </p:cNvSpPr>
+          <p:nvPr>
+            <p:ph type="body" idx="1"/>
+          </p:nvPr>
+        </p:nvSpPr>
+        <p:spPr/>
+        <p:txBody>
+          <a:bodyPr/>
+          <a:lstStyle/>
+          <a:p>
+            <a:endParaRPr lang="en-US"/>
+          </a:p>
+        </p:txBody>
+      </p:sp>
+    </p:spTree>
+    <p:extLst>
+      <p:ext uri="{BB962C8B-B14F-4D97-AF65-F5344CB8AC3E}">
+        <p14:creationId xmlns:p14="http://schemas.microsoft.com/office/powerpoint/2010/main" val="908885838"/>
+      </p:ext>
+    </p:extLst>
+  </p:cSld>
+  <p:clrMapOvr>
+    <a:masterClrMapping/>
+  </p:clrMapOvr>
+</p:sld>
+</file>
+
 <file path=ppt/slides/slide2.xml><?xml version="1.0" encoding="utf-8"?>
 <p:sld xmlns:a="http://schemas.openxmlformats.org/drawingml/2006/main" xmlns:r="http://schemas.openxmlformats.org/officeDocument/2006/relationships" xmlns:p="http://schemas.openxmlformats.org/presentationml/2006/main">
   <p:cSld>
@@ -6553,7 +6841,7 @@
         </p:spPr>
         <p:txBody>
           <a:bodyPr spcFirstLastPara="1" wrap="square" lIns="91425" tIns="91425" rIns="91425" bIns="91425" anchor="t" anchorCtr="0">
-            <a:normAutofit fontScale="85000" lnSpcReduction="10000"/>
+            <a:normAutofit fontScale="85000" lnSpcReduction="20000"/>
           </a:bodyPr>
           <a:lstStyle/>
           <a:p>
@@ -6568,10 +6856,10 @@
               <a:buChar char="●"/>
             </a:pPr>
             <a:r>
-              <a:rPr lang="en" sz="2225"/>
+              <a:rPr lang="en" sz="2225" dirty="0"/>
               <a:t>No experience for data organization or project management</a:t>
             </a:r>
-            <a:endParaRPr sz="2225"/>
+            <a:endParaRPr sz="2225" dirty="0"/>
           </a:p>
           <a:p>
             <a:pPr marL="457200" lvl="0" indent="-348735" algn="l" rtl="0">
@@ -6585,10 +6873,10 @@
               <a:buChar char="●"/>
             </a:pPr>
             <a:r>
-              <a:rPr lang="en" sz="2225"/>
+              <a:rPr lang="en" sz="2225" dirty="0"/>
               <a:t>Never worked with a large data set beyond some analysis on R </a:t>
             </a:r>
-            <a:endParaRPr sz="2225"/>
+            <a:endParaRPr sz="2225" dirty="0"/>
           </a:p>
           <a:p>
             <a:pPr marL="457200" lvl="0" indent="-348735" algn="l" rtl="0">
@@ -6602,10 +6890,10 @@
               <a:buChar char="●"/>
             </a:pPr>
             <a:r>
-              <a:rPr lang="en" sz="2225"/>
+              <a:rPr lang="en" sz="2225" dirty="0"/>
               <a:t>Reason for taking this course:</a:t>
             </a:r>
-            <a:endParaRPr sz="2225"/>
+            <a:endParaRPr sz="2225" dirty="0"/>
           </a:p>
           <a:p>
             <a:pPr marL="914400" lvl="1" indent="-327145" algn="l" rtl="0">
@@ -6619,10 +6907,10 @@
               <a:buChar char="○"/>
             </a:pPr>
             <a:r>
-              <a:rPr lang="en" sz="1825"/>
+              <a:rPr lang="en" sz="1825" dirty="0"/>
               <a:t>Familiarize myself with data organization</a:t>
             </a:r>
-            <a:endParaRPr sz="1825"/>
+            <a:endParaRPr sz="1825" dirty="0"/>
           </a:p>
           <a:p>
             <a:pPr marL="914400" lvl="1" indent="-327145" algn="l" rtl="0">
@@ -6636,10 +6924,10 @@
               <a:buChar char="○"/>
             </a:pPr>
             <a:r>
-              <a:rPr lang="en" sz="1825"/>
+              <a:rPr lang="en" sz="1825" dirty="0"/>
               <a:t>Learn best practices in project management especially when collaborating with other</a:t>
             </a:r>
-            <a:endParaRPr sz="1825"/>
+            <a:endParaRPr sz="1825" dirty="0"/>
           </a:p>
           <a:p>
             <a:pPr marL="914400" lvl="1" indent="-327145" algn="l" rtl="0">
@@ -6653,10 +6941,10 @@
               <a:buChar char="○"/>
             </a:pPr>
             <a:r>
-              <a:rPr lang="en" sz="1825"/>
+              <a:rPr lang="en" sz="1825" dirty="0"/>
               <a:t>Create an efficient and reproducible workflow from my data set</a:t>
             </a:r>
-            <a:endParaRPr/>
+            <a:endParaRPr dirty="0"/>
           </a:p>
         </p:txBody>
       </p:sp>
@@ -6676,7 +6964,7 @@
         </p:blipFill>
         <p:spPr>
           <a:xfrm>
-            <a:off x="4649225" y="1017475"/>
+            <a:off x="4649225" y="1017480"/>
             <a:ext cx="4267201" cy="3108539"/>
           </a:xfrm>
           <a:prstGeom prst="rect">
@@ -7661,7 +7949,7 @@
         </p:spPr>
         <p:txBody>
           <a:bodyPr spcFirstLastPara="1" wrap="square" lIns="91425" tIns="91425" rIns="91425" bIns="91425" anchor="t" anchorCtr="0">
-            <a:normAutofit fontScale="92500" lnSpcReduction="20000"/>
+            <a:normAutofit fontScale="85000" lnSpcReduction="20000"/>
           </a:bodyPr>
           <a:lstStyle/>
           <a:p>
@@ -7675,10 +7963,10 @@
               <a:buNone/>
             </a:pPr>
             <a:r>
-              <a:rPr lang="en" sz="2300"/>
+              <a:rPr lang="en" sz="2300" dirty="0"/>
               <a:t>Data visualization</a:t>
             </a:r>
-            <a:endParaRPr sz="2300"/>
+            <a:endParaRPr sz="2300" dirty="0"/>
           </a:p>
           <a:p>
             <a:pPr marL="0" lvl="0" indent="0" algn="l" rtl="0">
@@ -7691,10 +7979,10 @@
               <a:buNone/>
             </a:pPr>
             <a:r>
-              <a:rPr lang="en" sz="2300"/>
+              <a:rPr lang="en" sz="2300" dirty="0"/>
               <a:t>Linear modeling</a:t>
             </a:r>
-            <a:endParaRPr sz="2300"/>
+            <a:endParaRPr sz="2300" dirty="0"/>
           </a:p>
           <a:p>
             <a:pPr marL="0" lvl="0" indent="0" algn="l" rtl="0">
@@ -7707,10 +7995,10 @@
               <a:buNone/>
             </a:pPr>
             <a:r>
-              <a:rPr lang="en" sz="2300"/>
+              <a:rPr lang="en" sz="2300" dirty="0"/>
               <a:t>Hypothesis testing for effects of treatments</a:t>
             </a:r>
-            <a:endParaRPr sz="2300"/>
+            <a:endParaRPr sz="2300" dirty="0"/>
           </a:p>
           <a:p>
             <a:pPr marL="0" lvl="0" indent="0" algn="l" rtl="0">
@@ -7723,10 +8011,10 @@
               <a:buNone/>
             </a:pPr>
             <a:r>
-              <a:rPr lang="en" sz="2300"/>
+              <a:rPr lang="en" sz="2300" dirty="0"/>
               <a:t>Analysis of variance </a:t>
             </a:r>
-            <a:endParaRPr sz="2300"/>
+            <a:endParaRPr sz="2300" dirty="0"/>
           </a:p>
           <a:p>
             <a:pPr marL="0" lvl="0" indent="0" algn="l" rtl="0">
@@ -7739,10 +8027,10 @@
               <a:buNone/>
             </a:pPr>
             <a:r>
-              <a:rPr lang="en" sz="2300"/>
+              <a:rPr lang="en" sz="2300" dirty="0"/>
               <a:t>Mixed effect modeling</a:t>
             </a:r>
-            <a:endParaRPr sz="2300"/>
+            <a:endParaRPr sz="2300" dirty="0"/>
           </a:p>
           <a:p>
             <a:pPr marL="457200" lvl="0" indent="0" algn="l" rtl="0">
@@ -7755,10 +8043,10 @@
               <a:buNone/>
             </a:pPr>
             <a:r>
-              <a:rPr lang="en" sz="2300"/>
+              <a:rPr lang="en" sz="2300" dirty="0"/>
               <a:t>Streamlining this process and make it reproducible</a:t>
             </a:r>
-            <a:endParaRPr sz="2300"/>
+            <a:endParaRPr sz="2300" dirty="0"/>
           </a:p>
         </p:txBody>
       </p:sp>
@@ -7803,171 +8091,6 @@
   <p:cSld>
     <p:spTree>
       <p:nvGrpSpPr>
-        <p:cNvPr id="1" name="Shape 111"/>
-        <p:cNvGrpSpPr/>
-        <p:nvPr/>
-      </p:nvGrpSpPr>
-      <p:grpSpPr>
-        <a:xfrm>
-          <a:off x="0" y="0"/>
-          <a:ext cx="0" cy="0"/>
-          <a:chOff x="0" y="0"/>
-          <a:chExt cx="0" cy="0"/>
-        </a:xfrm>
-      </p:grpSpPr>
-      <p:sp>
-        <p:nvSpPr>
-          <p:cNvPr id="112" name="Google Shape;112;p20"/>
-          <p:cNvSpPr txBox="1">
-            <a:spLocks noGrp="1"/>
-          </p:cNvSpPr>
-          <p:nvPr>
-            <p:ph type="body" idx="1"/>
-          </p:nvPr>
-        </p:nvSpPr>
-        <p:spPr>
-          <a:xfrm>
-            <a:off x="311700" y="1152475"/>
-            <a:ext cx="6287700" cy="3416400"/>
-          </a:xfrm>
-          <a:prstGeom prst="rect">
-            <a:avLst/>
-          </a:prstGeom>
-        </p:spPr>
-        <p:txBody>
-          <a:bodyPr spcFirstLastPara="1" wrap="square" lIns="91425" tIns="91425" rIns="91425" bIns="91425" anchor="t" anchorCtr="0">
-            <a:normAutofit/>
-          </a:bodyPr>
-          <a:lstStyle/>
-          <a:p>
-            <a:pPr marL="457200" lvl="0" indent="-393700" algn="l" rtl="0">
-              <a:spcBef>
-                <a:spcPts val="0"/>
-              </a:spcBef>
-              <a:spcAft>
-                <a:spcPts val="0"/>
-              </a:spcAft>
-              <a:buSzPts val="2600"/>
-              <a:buChar char="-"/>
-            </a:pPr>
-            <a:r>
-              <a:rPr lang="en" sz="2600"/>
-              <a:t>Knowing where to start</a:t>
-            </a:r>
-            <a:endParaRPr sz="2600"/>
-          </a:p>
-          <a:p>
-            <a:pPr marL="457200" lvl="0" indent="-393700" algn="l" rtl="0">
-              <a:spcBef>
-                <a:spcPts val="0"/>
-              </a:spcBef>
-              <a:spcAft>
-                <a:spcPts val="0"/>
-              </a:spcAft>
-              <a:buSzPts val="2600"/>
-              <a:buChar char="-"/>
-            </a:pPr>
-            <a:r>
-              <a:rPr lang="en" sz="2600"/>
-              <a:t>How to use GitHub?</a:t>
-            </a:r>
-            <a:endParaRPr sz="2600"/>
-          </a:p>
-          <a:p>
-            <a:pPr marL="457200" lvl="0" indent="-393700" algn="l" rtl="0">
-              <a:spcBef>
-                <a:spcPts val="0"/>
-              </a:spcBef>
-              <a:spcAft>
-                <a:spcPts val="0"/>
-              </a:spcAft>
-              <a:buSzPts val="2600"/>
-              <a:buChar char="-"/>
-            </a:pPr>
-            <a:r>
-              <a:rPr lang="en" sz="2600"/>
-              <a:t>Breaking bad habits</a:t>
-            </a:r>
-            <a:endParaRPr sz="2600"/>
-          </a:p>
-          <a:p>
-            <a:pPr marL="457200" lvl="0" indent="-393700" algn="l" rtl="0">
-              <a:spcBef>
-                <a:spcPts val="0"/>
-              </a:spcBef>
-              <a:spcAft>
-                <a:spcPts val="0"/>
-              </a:spcAft>
-              <a:buSzPts val="2600"/>
-              <a:buChar char="-"/>
-            </a:pPr>
-            <a:r>
-              <a:rPr lang="en" sz="2600"/>
-              <a:t>Storage on my computer!</a:t>
-            </a:r>
-            <a:endParaRPr sz="2300"/>
-          </a:p>
-        </p:txBody>
-      </p:sp>
-      <p:sp>
-        <p:nvSpPr>
-          <p:cNvPr id="113" name="Google Shape;113;p20"/>
-          <p:cNvSpPr txBox="1">
-            <a:spLocks noGrp="1"/>
-          </p:cNvSpPr>
-          <p:nvPr>
-            <p:ph type="title"/>
-          </p:nvPr>
-        </p:nvSpPr>
-        <p:spPr>
-          <a:xfrm>
-            <a:off x="311700" y="445025"/>
-            <a:ext cx="8520600" cy="572700"/>
-          </a:xfrm>
-          <a:prstGeom prst="rect">
-            <a:avLst/>
-          </a:prstGeom>
-        </p:spPr>
-        <p:txBody>
-          <a:bodyPr spcFirstLastPara="1" wrap="square" lIns="91425" tIns="91425" rIns="91425" bIns="91425" anchor="t" anchorCtr="0">
-            <a:normAutofit fontScale="90000"/>
-          </a:bodyPr>
-          <a:lstStyle/>
-          <a:p>
-            <a:pPr marL="0" lvl="0" indent="0" algn="l" rtl="0">
-              <a:spcBef>
-                <a:spcPts val="0"/>
-              </a:spcBef>
-              <a:spcAft>
-                <a:spcPts val="0"/>
-              </a:spcAft>
-              <a:buNone/>
-            </a:pPr>
-            <a:r>
-              <a:rPr lang="en"/>
-              <a:t>Challenges</a:t>
-            </a:r>
-            <a:endParaRPr sz="1800">
-              <a:solidFill>
-                <a:schemeClr val="dk2"/>
-              </a:solidFill>
-            </a:endParaRPr>
-          </a:p>
-        </p:txBody>
-      </p:sp>
-    </p:spTree>
-  </p:cSld>
-  <p:clrMapOvr>
-    <a:masterClrMapping/>
-  </p:clrMapOvr>
-</p:sld>
-</file>
-
-<file path=ppt/slides/slide9.xml><?xml version="1.0" encoding="utf-8"?>
-<p:sld xmlns:a="http://schemas.openxmlformats.org/drawingml/2006/main" xmlns:r="http://schemas.openxmlformats.org/officeDocument/2006/relationships" xmlns:p="http://schemas.openxmlformats.org/presentationml/2006/main">
-  <p:cSld>
-    <p:spTree>
-      <p:nvGrpSpPr>
         <p:cNvPr id="1" name=""/>
         <p:cNvGrpSpPr/>
         <p:nvPr/>
@@ -7998,10 +8121,15 @@
         </p:nvSpPr>
         <p:spPr/>
         <p:txBody>
-          <a:bodyPr/>
+          <a:bodyPr>
+            <a:normAutofit fontScale="90000"/>
+          </a:bodyPr>
           <a:lstStyle/>
           <a:p>
-            <a:endParaRPr lang="en-US"/>
+            <a:r>
+              <a:rPr lang="en-US" dirty="0"/>
+              <a:t>Goals for this quarter</a:t>
+            </a:r>
           </a:p>
         </p:txBody>
       </p:sp>
@@ -8021,21 +8149,293 @@
             <p:ph type="body" idx="1"/>
           </p:nvPr>
         </p:nvSpPr>
-        <p:spPr/>
+        <p:spPr>
+          <a:xfrm>
+            <a:off x="311701" y="1152475"/>
+            <a:ext cx="5322482" cy="3416400"/>
+          </a:xfrm>
+        </p:spPr>
         <p:txBody>
-          <a:bodyPr/>
+          <a:bodyPr>
+            <a:normAutofit/>
+          </a:bodyPr>
           <a:lstStyle/>
           <a:p>
-            <a:endParaRPr lang="en-US"/>
+            <a:r>
+              <a:rPr lang="en-US" sz="2400" dirty="0"/>
+              <a:t>Learning to use GitHub</a:t>
+            </a:r>
+          </a:p>
+          <a:p>
+            <a:r>
+              <a:rPr lang="en-US" sz="2400" dirty="0"/>
+              <a:t>Improve file management and organization</a:t>
+            </a:r>
+          </a:p>
+          <a:p>
+            <a:r>
+              <a:rPr lang="en-US" sz="2400" dirty="0"/>
+              <a:t>Streamlining data analysis</a:t>
+            </a:r>
+          </a:p>
+          <a:p>
+            <a:r>
+              <a:rPr lang="en-US" sz="2400" dirty="0"/>
+              <a:t>Creating reproducible data for collaboration</a:t>
+            </a:r>
+          </a:p>
+          <a:p>
+            <a:endParaRPr lang="en-US" dirty="0"/>
           </a:p>
         </p:txBody>
       </p:sp>
+      <p:pic>
+        <p:nvPicPr>
+          <p:cNvPr id="5" name="Google Shape;93;p17">
+            <a:extLst>
+              <a:ext uri="{FF2B5EF4-FFF2-40B4-BE49-F238E27FC236}">
+                <a16:creationId xmlns:a16="http://schemas.microsoft.com/office/drawing/2014/main" id="{D7C5779C-BF01-7507-5F37-6268C3AFFCAE}"/>
+              </a:ext>
+            </a:extLst>
+          </p:cNvPr>
+          <p:cNvPicPr preferRelativeResize="0"/>
+          <p:nvPr/>
+        </p:nvPicPr>
+        <p:blipFill>
+          <a:blip r:embed="rId2">
+            <a:alphaModFix/>
+          </a:blip>
+          <a:stretch>
+            <a:fillRect/>
+          </a:stretch>
+        </p:blipFill>
+        <p:spPr>
+          <a:xfrm>
+            <a:off x="5288878" y="0"/>
+            <a:ext cx="3855122" cy="3629891"/>
+          </a:xfrm>
+          <a:prstGeom prst="rect">
+            <a:avLst/>
+          </a:prstGeom>
+          <a:noFill/>
+          <a:ln>
+            <a:noFill/>
+          </a:ln>
+        </p:spPr>
+      </p:pic>
     </p:spTree>
     <p:extLst>
       <p:ext uri="{BB962C8B-B14F-4D97-AF65-F5344CB8AC3E}">
         <p14:creationId xmlns:p14="http://schemas.microsoft.com/office/powerpoint/2010/main" val="648687589"/>
       </p:ext>
     </p:extLst>
+  </p:cSld>
+  <p:clrMapOvr>
+    <a:masterClrMapping/>
+  </p:clrMapOvr>
+</p:sld>
+</file>
+
+<file path=ppt/slides/slide9.xml><?xml version="1.0" encoding="utf-8"?>
+<p:sld xmlns:a="http://schemas.openxmlformats.org/drawingml/2006/main" xmlns:r="http://schemas.openxmlformats.org/officeDocument/2006/relationships" xmlns:p="http://schemas.openxmlformats.org/presentationml/2006/main">
+  <p:cSld>
+    <p:spTree>
+      <p:nvGrpSpPr>
+        <p:cNvPr id="1" name="Shape 111"/>
+        <p:cNvGrpSpPr/>
+        <p:nvPr/>
+      </p:nvGrpSpPr>
+      <p:grpSpPr>
+        <a:xfrm>
+          <a:off x="0" y="0"/>
+          <a:ext cx="0" cy="0"/>
+          <a:chOff x="0" y="0"/>
+          <a:chExt cx="0" cy="0"/>
+        </a:xfrm>
+      </p:grpSpPr>
+      <p:sp>
+        <p:nvSpPr>
+          <p:cNvPr id="112" name="Google Shape;112;p20"/>
+          <p:cNvSpPr txBox="1">
+            <a:spLocks noGrp="1"/>
+          </p:cNvSpPr>
+          <p:nvPr>
+            <p:ph type="body" idx="1"/>
+          </p:nvPr>
+        </p:nvSpPr>
+        <p:spPr>
+          <a:xfrm>
+            <a:off x="311700" y="1152475"/>
+            <a:ext cx="4823718" cy="3416400"/>
+          </a:xfrm>
+          <a:prstGeom prst="rect">
+            <a:avLst/>
+          </a:prstGeom>
+        </p:spPr>
+        <p:txBody>
+          <a:bodyPr spcFirstLastPara="1" wrap="square" lIns="91425" tIns="91425" rIns="91425" bIns="91425" anchor="t" anchorCtr="0">
+            <a:normAutofit fontScale="92500"/>
+          </a:bodyPr>
+          <a:lstStyle/>
+          <a:p>
+            <a:pPr marL="457200" lvl="0" indent="-393700" algn="l" rtl="0">
+              <a:spcBef>
+                <a:spcPts val="0"/>
+              </a:spcBef>
+              <a:spcAft>
+                <a:spcPts val="0"/>
+              </a:spcAft>
+              <a:buSzPts val="2600"/>
+              <a:buChar char="-"/>
+            </a:pPr>
+            <a:r>
+              <a:rPr lang="en-US" sz="2600" dirty="0"/>
+              <a:t>Computer issues - Encoding issue with </a:t>
+            </a:r>
+            <a:r>
+              <a:rPr lang="en-US" sz="2600" dirty="0" err="1"/>
+              <a:t>Rstudio</a:t>
+            </a:r>
+            <a:r>
+              <a:rPr lang="en-US" sz="2600" dirty="0"/>
+              <a:t> basically erased all my codes and work from the summer</a:t>
+            </a:r>
+          </a:p>
+          <a:p>
+            <a:pPr lvl="1" indent="-393700">
+              <a:buSzPts val="2600"/>
+              <a:buChar char="-"/>
+            </a:pPr>
+            <a:r>
+              <a:rPr lang="en-US" sz="2200" dirty="0"/>
+              <a:t>Important argument for GitHub for version control</a:t>
+            </a:r>
+          </a:p>
+          <a:p>
+            <a:pPr marL="457200" lvl="0" indent="-393700" algn="l" rtl="0">
+              <a:spcBef>
+                <a:spcPts val="0"/>
+              </a:spcBef>
+              <a:spcAft>
+                <a:spcPts val="0"/>
+              </a:spcAft>
+              <a:buSzPts val="2600"/>
+              <a:buChar char="-"/>
+            </a:pPr>
+            <a:r>
+              <a:rPr lang="en-US" sz="2600" dirty="0"/>
+              <a:t>Missing about a couple weeks of class because of travel</a:t>
+            </a:r>
+          </a:p>
+          <a:p>
+            <a:pPr marL="457200" lvl="0" indent="-393700" algn="l" rtl="0">
+              <a:spcBef>
+                <a:spcPts val="0"/>
+              </a:spcBef>
+              <a:spcAft>
+                <a:spcPts val="0"/>
+              </a:spcAft>
+              <a:buSzPts val="2600"/>
+              <a:buChar char="-"/>
+            </a:pPr>
+            <a:endParaRPr sz="2600" dirty="0"/>
+          </a:p>
+        </p:txBody>
+      </p:sp>
+      <p:sp>
+        <p:nvSpPr>
+          <p:cNvPr id="113" name="Google Shape;113;p20"/>
+          <p:cNvSpPr txBox="1">
+            <a:spLocks noGrp="1"/>
+          </p:cNvSpPr>
+          <p:nvPr>
+            <p:ph type="title"/>
+          </p:nvPr>
+        </p:nvSpPr>
+        <p:spPr>
+          <a:xfrm>
+            <a:off x="311700" y="445025"/>
+            <a:ext cx="8520600" cy="572700"/>
+          </a:xfrm>
+          <a:prstGeom prst="rect">
+            <a:avLst/>
+          </a:prstGeom>
+        </p:spPr>
+        <p:txBody>
+          <a:bodyPr spcFirstLastPara="1" wrap="square" lIns="91425" tIns="91425" rIns="91425" bIns="91425" anchor="t" anchorCtr="0">
+            <a:normAutofit fontScale="90000"/>
+          </a:bodyPr>
+          <a:lstStyle/>
+          <a:p>
+            <a:pPr marL="0" lvl="0" indent="0" algn="l" rtl="0">
+              <a:spcBef>
+                <a:spcPts val="0"/>
+              </a:spcBef>
+              <a:spcAft>
+                <a:spcPts val="0"/>
+              </a:spcAft>
+              <a:buNone/>
+            </a:pPr>
+            <a:r>
+              <a:rPr lang="en" dirty="0"/>
+              <a:t>Challenges</a:t>
+            </a:r>
+            <a:endParaRPr sz="1800" dirty="0">
+              <a:solidFill>
+                <a:schemeClr val="dk2"/>
+              </a:solidFill>
+            </a:endParaRPr>
+          </a:p>
+        </p:txBody>
+      </p:sp>
+      <p:pic>
+        <p:nvPicPr>
+          <p:cNvPr id="1026" name="Picture 2" descr="Two Buttons Meme - Imgflip">
+            <a:extLst>
+              <a:ext uri="{FF2B5EF4-FFF2-40B4-BE49-F238E27FC236}">
+                <a16:creationId xmlns:a16="http://schemas.microsoft.com/office/drawing/2014/main" id="{CFE870B6-B7EE-9616-FD89-2BF0FE5176D3}"/>
+              </a:ext>
+            </a:extLst>
+          </p:cNvPr>
+          <p:cNvPicPr>
+            <a:picLocks noChangeAspect="1" noChangeArrowheads="1"/>
+          </p:cNvPicPr>
+          <p:nvPr/>
+        </p:nvPicPr>
+        <p:blipFill>
+          <a:blip r:embed="rId3">
+            <a:extLst>
+              <a:ext uri="{28A0092B-C50C-407E-A947-70E740481C1C}">
+                <a14:useLocalDpi xmlns:a14="http://schemas.microsoft.com/office/drawing/2010/main" val="0"/>
+              </a:ext>
+            </a:extLst>
+          </a:blip>
+          <a:srcRect/>
+          <a:stretch>
+            <a:fillRect/>
+          </a:stretch>
+        </p:blipFill>
+        <p:spPr bwMode="auto">
+          <a:xfrm>
+            <a:off x="5741987" y="0"/>
+            <a:ext cx="3402013" cy="5143500"/>
+          </a:xfrm>
+          <a:prstGeom prst="rect">
+            <a:avLst/>
+          </a:prstGeom>
+          <a:noFill/>
+          <a:extLst>
+            <a:ext uri="{909E8E84-426E-40DD-AFC4-6F175D3DCCD1}">
+              <a14:hiddenFill xmlns:a14="http://schemas.microsoft.com/office/drawing/2010/main">
+                <a:solidFill>
+                  <a:srgbClr val="FFFFFF"/>
+                </a:solidFill>
+              </a14:hiddenFill>
+            </a:ext>
+          </a:extLst>
+        </p:spPr>
+      </p:pic>
+    </p:spTree>
   </p:cSld>
   <p:clrMapOvr>
     <a:masterClrMapping/>

</xml_diff>

<commit_message>
Update Project Proposal for Analytical Workflow, Fall 2022.pptx
</commit_message>
<xml_diff>
--- a/Project Proposal for Analytical Workflow, Fall 2022.pptx
+++ b/Project Proposal for Analytical Workflow, Fall 2022.pptx
@@ -5,7 +5,7 @@
     <p:sldMasterId id="2147483659" r:id="rId1"/>
   </p:sldMasterIdLst>
   <p:notesMasterIdLst>
-    <p:notesMasterId r:id="rId14"/>
+    <p:notesMasterId r:id="rId11"/>
   </p:notesMasterIdLst>
   <p:sldIdLst>
     <p:sldId id="256" r:id="rId2"/>
@@ -17,9 +17,6 @@
     <p:sldId id="262" r:id="rId8"/>
     <p:sldId id="264" r:id="rId9"/>
     <p:sldId id="263" r:id="rId10"/>
-    <p:sldId id="266" r:id="rId11"/>
-    <p:sldId id="267" r:id="rId12"/>
-    <p:sldId id="268" r:id="rId13"/>
   </p:sldIdLst>
   <p:sldSz cx="9144000" cy="5143500" type="screen16x9"/>
   <p:notesSz cx="6858000" cy="9144000"/>
@@ -6476,291 +6473,6 @@
 </p:sld>
 </file>
 
-<file path=ppt/slides/slide10.xml><?xml version="1.0" encoding="utf-8"?>
-<p:sld xmlns:a="http://schemas.openxmlformats.org/drawingml/2006/main" xmlns:r="http://schemas.openxmlformats.org/officeDocument/2006/relationships" xmlns:p="http://schemas.openxmlformats.org/presentationml/2006/main">
-  <p:cSld>
-    <p:spTree>
-      <p:nvGrpSpPr>
-        <p:cNvPr id="1" name=""/>
-        <p:cNvGrpSpPr/>
-        <p:nvPr/>
-      </p:nvGrpSpPr>
-      <p:grpSpPr>
-        <a:xfrm>
-          <a:off x="0" y="0"/>
-          <a:ext cx="0" cy="0"/>
-          <a:chOff x="0" y="0"/>
-          <a:chExt cx="0" cy="0"/>
-        </a:xfrm>
-      </p:grpSpPr>
-      <p:sp>
-        <p:nvSpPr>
-          <p:cNvPr id="2" name="Title 1">
-            <a:extLst>
-              <a:ext uri="{FF2B5EF4-FFF2-40B4-BE49-F238E27FC236}">
-                <a16:creationId xmlns:a16="http://schemas.microsoft.com/office/drawing/2014/main" id="{EFEDD688-27DF-D692-0E0D-AED3E5476ADB}"/>
-              </a:ext>
-            </a:extLst>
-          </p:cNvPr>
-          <p:cNvSpPr>
-            <a:spLocks noGrp="1"/>
-          </p:cNvSpPr>
-          <p:nvPr>
-            <p:ph type="title"/>
-          </p:nvPr>
-        </p:nvSpPr>
-        <p:spPr/>
-        <p:txBody>
-          <a:bodyPr>
-            <a:normAutofit fontScale="90000"/>
-          </a:bodyPr>
-          <a:lstStyle/>
-          <a:p>
-            <a:r>
-              <a:rPr lang="en-US" dirty="0"/>
-              <a:t>Success this quarter</a:t>
-            </a:r>
-          </a:p>
-        </p:txBody>
-      </p:sp>
-      <p:sp>
-        <p:nvSpPr>
-          <p:cNvPr id="3" name="Text Placeholder 2">
-            <a:extLst>
-              <a:ext uri="{FF2B5EF4-FFF2-40B4-BE49-F238E27FC236}">
-                <a16:creationId xmlns:a16="http://schemas.microsoft.com/office/drawing/2014/main" id="{203FD2DD-C994-602C-2DE5-A867307220FB}"/>
-              </a:ext>
-            </a:extLst>
-          </p:cNvPr>
-          <p:cNvSpPr>
-            <a:spLocks noGrp="1"/>
-          </p:cNvSpPr>
-          <p:nvPr>
-            <p:ph type="body" idx="1"/>
-          </p:nvPr>
-        </p:nvSpPr>
-        <p:spPr/>
-        <p:txBody>
-          <a:bodyPr/>
-          <a:lstStyle/>
-          <a:p>
-            <a:r>
-              <a:rPr lang="en-US" dirty="0"/>
-              <a:t>Recreate results and graphical outputs </a:t>
-            </a:r>
-          </a:p>
-          <a:p>
-            <a:r>
-              <a:rPr lang="en-US" dirty="0"/>
-              <a:t>Improve file organization</a:t>
-            </a:r>
-          </a:p>
-          <a:p>
-            <a:r>
-              <a:rPr lang="en-US" dirty="0"/>
-              <a:t>Streamlining data analysis</a:t>
-            </a:r>
-          </a:p>
-          <a:p>
-            <a:r>
-              <a:rPr lang="en-US" dirty="0"/>
-              <a:t>Creating reproducibility </a:t>
-            </a:r>
-          </a:p>
-          <a:p>
-            <a:r>
-              <a:rPr lang="en-US" dirty="0"/>
-              <a:t>Streamlining this process and make it reproducible</a:t>
-            </a:r>
-          </a:p>
-          <a:p>
-            <a:endParaRPr lang="en-US" dirty="0"/>
-          </a:p>
-        </p:txBody>
-      </p:sp>
-    </p:spTree>
-    <p:extLst>
-      <p:ext uri="{BB962C8B-B14F-4D97-AF65-F5344CB8AC3E}">
-        <p14:creationId xmlns:p14="http://schemas.microsoft.com/office/powerpoint/2010/main" val="3121009972"/>
-      </p:ext>
-    </p:extLst>
-  </p:cSld>
-  <p:clrMapOvr>
-    <a:masterClrMapping/>
-  </p:clrMapOvr>
-</p:sld>
-</file>
-
-<file path=ppt/slides/slide11.xml><?xml version="1.0" encoding="utf-8"?>
-<p:sld xmlns:a="http://schemas.openxmlformats.org/drawingml/2006/main" xmlns:r="http://schemas.openxmlformats.org/officeDocument/2006/relationships" xmlns:p="http://schemas.openxmlformats.org/presentationml/2006/main">
-  <p:cSld>
-    <p:spTree>
-      <p:nvGrpSpPr>
-        <p:cNvPr id="1" name=""/>
-        <p:cNvGrpSpPr/>
-        <p:nvPr/>
-      </p:nvGrpSpPr>
-      <p:grpSpPr>
-        <a:xfrm>
-          <a:off x="0" y="0"/>
-          <a:ext cx="0" cy="0"/>
-          <a:chOff x="0" y="0"/>
-          <a:chExt cx="0" cy="0"/>
-        </a:xfrm>
-      </p:grpSpPr>
-      <p:sp>
-        <p:nvSpPr>
-          <p:cNvPr id="2" name="Title 1">
-            <a:extLst>
-              <a:ext uri="{FF2B5EF4-FFF2-40B4-BE49-F238E27FC236}">
-                <a16:creationId xmlns:a16="http://schemas.microsoft.com/office/drawing/2014/main" id="{EFEDD688-27DF-D692-0E0D-AED3E5476ADB}"/>
-              </a:ext>
-            </a:extLst>
-          </p:cNvPr>
-          <p:cNvSpPr>
-            <a:spLocks noGrp="1"/>
-          </p:cNvSpPr>
-          <p:nvPr>
-            <p:ph type="title"/>
-          </p:nvPr>
-        </p:nvSpPr>
-        <p:spPr/>
-        <p:txBody>
-          <a:bodyPr>
-            <a:normAutofit fontScale="90000"/>
-          </a:bodyPr>
-          <a:lstStyle/>
-          <a:p>
-            <a:r>
-              <a:rPr lang="en-US" dirty="0"/>
-              <a:t>Scientific insights achieved</a:t>
-            </a:r>
-          </a:p>
-        </p:txBody>
-      </p:sp>
-      <p:sp>
-        <p:nvSpPr>
-          <p:cNvPr id="3" name="Text Placeholder 2">
-            <a:extLst>
-              <a:ext uri="{FF2B5EF4-FFF2-40B4-BE49-F238E27FC236}">
-                <a16:creationId xmlns:a16="http://schemas.microsoft.com/office/drawing/2014/main" id="{203FD2DD-C994-602C-2DE5-A867307220FB}"/>
-              </a:ext>
-            </a:extLst>
-          </p:cNvPr>
-          <p:cNvSpPr>
-            <a:spLocks noGrp="1"/>
-          </p:cNvSpPr>
-          <p:nvPr>
-            <p:ph type="body" idx="1"/>
-          </p:nvPr>
-        </p:nvSpPr>
-        <p:spPr/>
-        <p:txBody>
-          <a:bodyPr/>
-          <a:lstStyle/>
-          <a:p>
-            <a:endParaRPr lang="en-US"/>
-          </a:p>
-        </p:txBody>
-      </p:sp>
-    </p:spTree>
-    <p:extLst>
-      <p:ext uri="{BB962C8B-B14F-4D97-AF65-F5344CB8AC3E}">
-        <p14:creationId xmlns:p14="http://schemas.microsoft.com/office/powerpoint/2010/main" val="4052157631"/>
-      </p:ext>
-    </p:extLst>
-  </p:cSld>
-  <p:clrMapOvr>
-    <a:masterClrMapping/>
-  </p:clrMapOvr>
-</p:sld>
-</file>
-
-<file path=ppt/slides/slide12.xml><?xml version="1.0" encoding="utf-8"?>
-<p:sld xmlns:a="http://schemas.openxmlformats.org/drawingml/2006/main" xmlns:r="http://schemas.openxmlformats.org/officeDocument/2006/relationships" xmlns:p="http://schemas.openxmlformats.org/presentationml/2006/main">
-  <p:cSld>
-    <p:spTree>
-      <p:nvGrpSpPr>
-        <p:cNvPr id="1" name=""/>
-        <p:cNvGrpSpPr/>
-        <p:nvPr/>
-      </p:nvGrpSpPr>
-      <p:grpSpPr>
-        <a:xfrm>
-          <a:off x="0" y="0"/>
-          <a:ext cx="0" cy="0"/>
-          <a:chOff x="0" y="0"/>
-          <a:chExt cx="0" cy="0"/>
-        </a:xfrm>
-      </p:grpSpPr>
-      <p:sp>
-        <p:nvSpPr>
-          <p:cNvPr id="2" name="Title 1">
-            <a:extLst>
-              <a:ext uri="{FF2B5EF4-FFF2-40B4-BE49-F238E27FC236}">
-                <a16:creationId xmlns:a16="http://schemas.microsoft.com/office/drawing/2014/main" id="{EFEDD688-27DF-D692-0E0D-AED3E5476ADB}"/>
-              </a:ext>
-            </a:extLst>
-          </p:cNvPr>
-          <p:cNvSpPr>
-            <a:spLocks noGrp="1"/>
-          </p:cNvSpPr>
-          <p:nvPr>
-            <p:ph type="title"/>
-          </p:nvPr>
-        </p:nvSpPr>
-        <p:spPr/>
-        <p:txBody>
-          <a:bodyPr>
-            <a:normAutofit fontScale="90000"/>
-          </a:bodyPr>
-          <a:lstStyle/>
-          <a:p>
-            <a:r>
-              <a:rPr lang="en-US" dirty="0"/>
-              <a:t>Main sticking points and future plans</a:t>
-            </a:r>
-          </a:p>
-        </p:txBody>
-      </p:sp>
-      <p:sp>
-        <p:nvSpPr>
-          <p:cNvPr id="3" name="Text Placeholder 2">
-            <a:extLst>
-              <a:ext uri="{FF2B5EF4-FFF2-40B4-BE49-F238E27FC236}">
-                <a16:creationId xmlns:a16="http://schemas.microsoft.com/office/drawing/2014/main" id="{203FD2DD-C994-602C-2DE5-A867307220FB}"/>
-              </a:ext>
-            </a:extLst>
-          </p:cNvPr>
-          <p:cNvSpPr>
-            <a:spLocks noGrp="1"/>
-          </p:cNvSpPr>
-          <p:nvPr>
-            <p:ph type="body" idx="1"/>
-          </p:nvPr>
-        </p:nvSpPr>
-        <p:spPr/>
-        <p:txBody>
-          <a:bodyPr/>
-          <a:lstStyle/>
-          <a:p>
-            <a:endParaRPr lang="en-US"/>
-          </a:p>
-        </p:txBody>
-      </p:sp>
-    </p:spTree>
-    <p:extLst>
-      <p:ext uri="{BB962C8B-B14F-4D97-AF65-F5344CB8AC3E}">
-        <p14:creationId xmlns:p14="http://schemas.microsoft.com/office/powerpoint/2010/main" val="908885838"/>
-      </p:ext>
-    </p:extLst>
-  </p:cSld>
-  <p:clrMapOvr>
-    <a:masterClrMapping/>
-  </p:clrMapOvr>
-</p:sld>
-</file>
-
 <file path=ppt/slides/slide2.xml><?xml version="1.0" encoding="utf-8"?>
 <p:sld xmlns:a="http://schemas.openxmlformats.org/drawingml/2006/main" xmlns:r="http://schemas.openxmlformats.org/officeDocument/2006/relationships" xmlns:p="http://schemas.openxmlformats.org/presentationml/2006/main">
   <p:cSld>

</xml_diff>